<commit_message>
QCBio talk final draft
</commit_message>
<xml_diff>
--- a/QCBio luncheon 2020/Presentation1.pptx
+++ b/QCBio luncheon 2020/Presentation1.pptx
@@ -208,7 +208,7 @@
           <a:p>
             <a:fld id="{C0637069-2E57-EC48-AEE9-D9084A574C9B}" type="datetimeFigureOut">
               <a:rPr lang="en-US" smtClean="0"/>
-              <a:t>20/1/29</a:t>
+              <a:t>20/1/30</a:t>
             </a:fld>
             <a:endParaRPr lang="en-US"/>
           </a:p>
@@ -792,7 +792,7 @@
           <a:p>
             <a:fld id="{51A6E329-1FAF-DA41-AFB6-CE80DCBD6FF0}" type="datetimeFigureOut">
               <a:rPr lang="en-US" smtClean="0"/>
-              <a:t>20/1/29</a:t>
+              <a:t>20/1/30</a:t>
             </a:fld>
             <a:endParaRPr lang="en-US"/>
           </a:p>
@@ -993,7 +993,7 @@
           <a:p>
             <a:fld id="{51A6E329-1FAF-DA41-AFB6-CE80DCBD6FF0}" type="datetimeFigureOut">
               <a:rPr lang="en-US" smtClean="0"/>
-              <a:t>20/1/29</a:t>
+              <a:t>20/1/30</a:t>
             </a:fld>
             <a:endParaRPr lang="en-US"/>
           </a:p>
@@ -1168,7 +1168,7 @@
           <a:p>
             <a:fld id="{51A6E329-1FAF-DA41-AFB6-CE80DCBD6FF0}" type="datetimeFigureOut">
               <a:rPr lang="en-US" smtClean="0"/>
-              <a:t>20/1/29</a:t>
+              <a:t>20/1/30</a:t>
             </a:fld>
             <a:endParaRPr lang="en-US"/>
           </a:p>
@@ -1333,7 +1333,7 @@
           <a:p>
             <a:fld id="{51A6E329-1FAF-DA41-AFB6-CE80DCBD6FF0}" type="datetimeFigureOut">
               <a:rPr lang="en-US" smtClean="0"/>
-              <a:t>20/1/29</a:t>
+              <a:t>20/1/30</a:t>
             </a:fld>
             <a:endParaRPr lang="en-US"/>
           </a:p>
@@ -1581,7 +1581,7 @@
           <a:p>
             <a:fld id="{51A6E329-1FAF-DA41-AFB6-CE80DCBD6FF0}" type="datetimeFigureOut">
               <a:rPr lang="en-US" smtClean="0"/>
-              <a:t>20/1/29</a:t>
+              <a:t>20/1/30</a:t>
             </a:fld>
             <a:endParaRPr lang="en-US"/>
           </a:p>
@@ -1899,7 +1899,7 @@
           <a:p>
             <a:fld id="{51A6E329-1FAF-DA41-AFB6-CE80DCBD6FF0}" type="datetimeFigureOut">
               <a:rPr lang="en-US" smtClean="0"/>
-              <a:t>20/1/29</a:t>
+              <a:t>20/1/30</a:t>
             </a:fld>
             <a:endParaRPr lang="en-US"/>
           </a:p>
@@ -2365,7 +2365,7 @@
           <a:p>
             <a:fld id="{51A6E329-1FAF-DA41-AFB6-CE80DCBD6FF0}" type="datetimeFigureOut">
               <a:rPr lang="en-US" smtClean="0"/>
-              <a:t>20/1/29</a:t>
+              <a:t>20/1/30</a:t>
             </a:fld>
             <a:endParaRPr lang="en-US"/>
           </a:p>
@@ -2513,7 +2513,7 @@
           <a:p>
             <a:fld id="{51A6E329-1FAF-DA41-AFB6-CE80DCBD6FF0}" type="datetimeFigureOut">
               <a:rPr lang="en-US" smtClean="0"/>
-              <a:t>20/1/29</a:t>
+              <a:t>20/1/30</a:t>
             </a:fld>
             <a:endParaRPr lang="en-US"/>
           </a:p>
@@ -2603,7 +2603,7 @@
           <a:p>
             <a:fld id="{51A6E329-1FAF-DA41-AFB6-CE80DCBD6FF0}" type="datetimeFigureOut">
               <a:rPr lang="en-US" smtClean="0"/>
-              <a:t>20/1/29</a:t>
+              <a:t>20/1/30</a:t>
             </a:fld>
             <a:endParaRPr lang="en-US"/>
           </a:p>
@@ -2877,7 +2877,7 @@
           <a:p>
             <a:fld id="{51A6E329-1FAF-DA41-AFB6-CE80DCBD6FF0}" type="datetimeFigureOut">
               <a:rPr lang="en-US" smtClean="0"/>
-              <a:t>20/1/29</a:t>
+              <a:t>20/1/30</a:t>
             </a:fld>
             <a:endParaRPr lang="en-US"/>
           </a:p>
@@ -3183,7 +3183,7 @@
           <a:p>
             <a:fld id="{51A6E329-1FAF-DA41-AFB6-CE80DCBD6FF0}" type="datetimeFigureOut">
               <a:rPr lang="en-US" smtClean="0"/>
-              <a:t>20/1/29</a:t>
+              <a:t>20/1/30</a:t>
             </a:fld>
             <a:endParaRPr lang="en-US"/>
           </a:p>
@@ -3481,7 +3481,7 @@
           <a:p>
             <a:fld id="{51A6E329-1FAF-DA41-AFB6-CE80DCBD6FF0}" type="datetimeFigureOut">
               <a:rPr lang="en-US" smtClean="0"/>
-              <a:t>20/1/29</a:t>
+              <a:t>20/1/30</a:t>
             </a:fld>
             <a:endParaRPr lang="en-US"/>
           </a:p>
@@ -4017,13 +4017,8 @@
             </a:r>
             <a:r>
               <a:rPr lang="en-US" dirty="0" smtClean="0"/>
-              <a:t>except </a:t>
-            </a:r>
-            <a:r>
-              <a:rPr lang="en-US" dirty="0" smtClean="0"/>
-              <a:t>1 thing. Multiple regression captures this effect.</a:t>
-            </a:r>
-            <a:endParaRPr lang="en-US" dirty="0" smtClean="0"/>
+              <a:t>except 1 thing. Multiple regression captures this effect.</a:t>
+            </a:r>
           </a:p>
           <a:p>
             <a:endParaRPr lang="en-US" dirty="0"/>
@@ -4179,11 +4174,7 @@
             </a:r>
             <a:r>
               <a:rPr lang="en-US" sz="3000" dirty="0" smtClean="0"/>
-              <a:t>: Multiple regressions measure covariate </a:t>
-            </a:r>
-            <a:r>
-              <a:rPr lang="en-US" sz="3000" dirty="0" smtClean="0"/>
-              <a:t>effects </a:t>
+              <a:t>: Multiple regressions measure covariate effects </a:t>
             </a:r>
             <a:r>
               <a:rPr lang="en-US" sz="3000" b="1" dirty="0" smtClean="0">
@@ -4191,23 +4182,7 @@
                   <a:srgbClr val="FF0000"/>
                 </a:solidFill>
               </a:rPr>
-              <a:t>as if other </a:t>
-            </a:r>
-            <a:r>
-              <a:rPr lang="en-US" sz="3000" b="1" dirty="0" smtClean="0">
-                <a:solidFill>
-                  <a:srgbClr val="FF0000"/>
-                </a:solidFill>
-              </a:rPr>
-              <a:t>covariates are </a:t>
-            </a:r>
-            <a:r>
-              <a:rPr lang="en-US" sz="3000" b="1" dirty="0" smtClean="0">
-                <a:solidFill>
-                  <a:srgbClr val="FF0000"/>
-                </a:solidFill>
-              </a:rPr>
-              <a:t>fixed</a:t>
+              <a:t>as if other covariates are fixed</a:t>
             </a:r>
             <a:r>
               <a:rPr lang="en-US" sz="3000" dirty="0" smtClean="0"/>
@@ -4410,11 +4385,7 @@
             </a:fld>
             <a:r>
               <a:rPr lang="en-US" sz="1600" dirty="0" smtClean="0"/>
-              <a:t>/</a:t>
-            </a:r>
-            <a:r>
-              <a:rPr lang="en-US" sz="1600" dirty="0" smtClean="0"/>
-              <a:t>17</a:t>
+              <a:t>/17</a:t>
             </a:r>
             <a:endParaRPr lang="en-US" sz="1600" dirty="0"/>
           </a:p>
@@ -4580,23 +4551,7 @@
           <a:p>
             <a:r>
               <a:rPr lang="en-US" sz="3200" dirty="0" smtClean="0"/>
-              <a:t>Did people attempt </a:t>
-            </a:r>
-            <a:r>
-              <a:rPr lang="en-US" sz="3200" dirty="0" smtClean="0"/>
-              <a:t>multiple </a:t>
-            </a:r>
-            <a:r>
-              <a:rPr lang="en-US" sz="3200" dirty="0" smtClean="0"/>
-              <a:t>regression </a:t>
-            </a:r>
-            <a:r>
-              <a:rPr lang="en-US" sz="3200" dirty="0" smtClean="0"/>
-              <a:t>GWAS</a:t>
-            </a:r>
-            <a:r>
-              <a:rPr lang="en-US" sz="3200" dirty="0" smtClean="0"/>
-              <a:t>?</a:t>
+              <a:t>Did people attempt multiple regression GWAS?</a:t>
             </a:r>
             <a:endParaRPr lang="en-US" sz="3200" dirty="0"/>
           </a:p>
@@ -4804,11 +4759,7 @@
             </a:fld>
             <a:r>
               <a:rPr lang="en-US" sz="1600" dirty="0" smtClean="0"/>
-              <a:t>/</a:t>
-            </a:r>
-            <a:r>
-              <a:rPr lang="en-US" sz="1600" dirty="0" smtClean="0"/>
-              <a:t>17</a:t>
+              <a:t>/17</a:t>
             </a:r>
             <a:endParaRPr lang="en-US" sz="1600" dirty="0"/>
           </a:p>
@@ -4880,7 +4831,6 @@
               <a:rPr lang="en-US" dirty="0"/>
               <a:t> Marginal testing</a:t>
             </a:r>
-            <a:endParaRPr lang="en-US" dirty="0"/>
           </a:p>
         </p:txBody>
       </p:sp>
@@ -5741,15 +5691,7 @@
           <a:p>
             <a:r>
               <a:rPr lang="en-US" dirty="0" smtClean="0"/>
-              <a:t>      = </a:t>
-            </a:r>
-            <a:r>
-              <a:rPr lang="en-US" dirty="0" smtClean="0"/>
-              <a:t>false positives (lower means good</a:t>
-            </a:r>
-            <a:r>
-              <a:rPr lang="en-US" dirty="0" smtClean="0"/>
-              <a:t>)</a:t>
+              <a:t>      = false positives (lower means good)</a:t>
             </a:r>
           </a:p>
         </p:txBody>
@@ -6136,11 +6078,7 @@
             </a:fld>
             <a:r>
               <a:rPr lang="en-US" sz="1600" dirty="0" smtClean="0"/>
-              <a:t>/</a:t>
-            </a:r>
-            <a:r>
-              <a:rPr lang="en-US" sz="1600" dirty="0" smtClean="0"/>
-              <a:t>17</a:t>
+              <a:t>/17</a:t>
             </a:r>
             <a:endParaRPr lang="en-US" sz="1600" dirty="0"/>
           </a:p>
@@ -6207,11 +6145,7 @@
           <a:p>
             <a:r>
               <a:rPr lang="en-US" sz="3000" dirty="0" smtClean="0"/>
-              <a:t>Lasso’s high false positives are</a:t>
-            </a:r>
-            <a:r>
-              <a:rPr lang="en-US" sz="3000" dirty="0" smtClean="0"/>
-              <a:t> due to shrinkage</a:t>
+              <a:t>Lasso’s high false positives are due to shrinkage</a:t>
             </a:r>
             <a:endParaRPr lang="en-US" sz="3000" dirty="0"/>
           </a:p>
@@ -6239,7 +6173,7 @@
         </p:blipFill>
         <p:spPr>
           <a:xfrm>
-            <a:off x="622905" y="1931938"/>
+            <a:off x="537612" y="3216753"/>
             <a:ext cx="7813524" cy="2384082"/>
           </a:xfrm>
           <a:prstGeom prst="rect">
@@ -6255,7 +6189,7 @@
         </p:nvSpPr>
         <p:spPr>
           <a:xfrm>
-            <a:off x="708198" y="4649855"/>
+            <a:off x="622905" y="5934670"/>
             <a:ext cx="6933246" cy="923330"/>
           </a:xfrm>
           <a:prstGeom prst="rect">
@@ -6305,7 +6239,7 @@
         </p:nvSpPr>
         <p:spPr>
           <a:xfrm>
-            <a:off x="1088571" y="5817809"/>
+            <a:off x="1120519" y="1889116"/>
             <a:ext cx="6307667" cy="646331"/>
           </a:xfrm>
           <a:prstGeom prst="rect">
@@ -6336,7 +6270,7 @@
         </p:nvSpPr>
         <p:spPr>
           <a:xfrm>
-            <a:off x="1088571" y="5745238"/>
+            <a:off x="1120519" y="1816545"/>
             <a:ext cx="6513285" cy="852714"/>
           </a:xfrm>
           <a:prstGeom prst="frame">
@@ -6406,11 +6340,7 @@
             </a:fld>
             <a:r>
               <a:rPr lang="en-US" sz="1600" dirty="0" smtClean="0"/>
-              <a:t>/</a:t>
-            </a:r>
-            <a:r>
-              <a:rPr lang="en-US" sz="1600" dirty="0" smtClean="0"/>
-              <a:t>17</a:t>
+              <a:t>/17</a:t>
             </a:r>
             <a:endParaRPr lang="en-US" sz="1600" dirty="0"/>
           </a:p>
@@ -7320,11 +7250,7 @@
             </a:fld>
             <a:r>
               <a:rPr lang="en-US" sz="1600" dirty="0" smtClean="0"/>
-              <a:t>/</a:t>
-            </a:r>
-            <a:r>
-              <a:rPr lang="en-US" sz="1600" dirty="0" smtClean="0"/>
-              <a:t>17</a:t>
+              <a:t>/17</a:t>
             </a:r>
             <a:endParaRPr lang="en-US" sz="1600" dirty="0"/>
           </a:p>
@@ -7340,6 +7266,13 @@
   <p:clrMapOvr>
     <a:masterClrMapping/>
   </p:clrMapOvr>
+  <p:timing>
+    <p:tnLst>
+      <p:par>
+        <p:cTn xmlns:p14="http://schemas.microsoft.com/office/powerpoint/2010/main" id="1" dur="indefinite" restart="never" nodeType="tmRoot"/>
+      </p:par>
+    </p:tnLst>
+  </p:timing>
 </p:sld>
 </file>
 
@@ -7709,11 +7642,7 @@
                     <a:p>
                       <a:r>
                         <a:rPr lang="en-US" dirty="0" smtClean="0"/>
-                        <a:t>IHT </a:t>
-                      </a:r>
-                      <a:r>
-                        <a:rPr lang="en-US" dirty="0" smtClean="0"/>
-                        <a:t>TP</a:t>
+                        <a:t>IHT TP</a:t>
                       </a:r>
                       <a:endParaRPr lang="en-US" dirty="0"/>
                     </a:p>
@@ -9344,15 +9273,7 @@
           <a:p>
             <a:r>
               <a:rPr lang="en-US" dirty="0" smtClean="0"/>
-              <a:t>      = </a:t>
-            </a:r>
-            <a:r>
-              <a:rPr lang="en-US" dirty="0" smtClean="0"/>
-              <a:t>false positives (lower means good</a:t>
-            </a:r>
-            <a:r>
-              <a:rPr lang="en-US" dirty="0" smtClean="0"/>
-              <a:t>)</a:t>
+              <a:t>      = false positives (lower means good)</a:t>
             </a:r>
           </a:p>
         </p:txBody>
@@ -9785,11 +9706,7 @@
             </a:fld>
             <a:r>
               <a:rPr lang="en-US" sz="1600" dirty="0" smtClean="0"/>
-              <a:t>/</a:t>
-            </a:r>
-            <a:r>
-              <a:rPr lang="en-US" sz="1600" dirty="0" smtClean="0"/>
-              <a:t>17</a:t>
+              <a:t>/17</a:t>
             </a:r>
             <a:endParaRPr lang="en-US" sz="1600" dirty="0"/>
           </a:p>
@@ -9967,11 +9884,7 @@
             </a:fld>
             <a:r>
               <a:rPr lang="en-US" sz="1600" dirty="0" smtClean="0"/>
-              <a:t>/</a:t>
-            </a:r>
-            <a:r>
-              <a:rPr lang="en-US" sz="1600" dirty="0" smtClean="0"/>
-              <a:t>17</a:t>
+              <a:t>/17</a:t>
             </a:r>
             <a:endParaRPr lang="en-US" sz="1600" dirty="0"/>
           </a:p>
@@ -10246,11 +10159,7 @@
             </a:fld>
             <a:r>
               <a:rPr lang="en-US" sz="1600" dirty="0" smtClean="0"/>
-              <a:t>/</a:t>
-            </a:r>
-            <a:r>
-              <a:rPr lang="en-US" sz="1600" dirty="0" smtClean="0"/>
-              <a:t>17</a:t>
+              <a:t>/17</a:t>
             </a:r>
             <a:endParaRPr lang="en-US" sz="1600" dirty="0"/>
           </a:p>
@@ -10524,11 +10433,7 @@
             </a:fld>
             <a:r>
               <a:rPr lang="en-US" sz="1600" dirty="0" smtClean="0"/>
-              <a:t>/</a:t>
-            </a:r>
-            <a:r>
-              <a:rPr lang="en-US" sz="1600" dirty="0" smtClean="0"/>
-              <a:t>17</a:t>
+              <a:t>/17</a:t>
             </a:r>
             <a:endParaRPr lang="en-US" sz="1600" dirty="0"/>
           </a:p>
@@ -11231,11 +11136,7 @@
             </a:fld>
             <a:r>
               <a:rPr lang="en-US" sz="1600" dirty="0" smtClean="0"/>
-              <a:t>/</a:t>
-            </a:r>
-            <a:r>
-              <a:rPr lang="en-US" sz="1600" dirty="0" smtClean="0"/>
-              <a:t>17</a:t>
+              <a:t>/17</a:t>
             </a:r>
             <a:endParaRPr lang="en-US" sz="1600" dirty="0"/>
           </a:p>
@@ -11994,11 +11895,7 @@
             </a:fld>
             <a:r>
               <a:rPr lang="en-US" sz="1600" dirty="0" smtClean="0"/>
-              <a:t>/</a:t>
-            </a:r>
-            <a:r>
-              <a:rPr lang="en-US" sz="1600" dirty="0" smtClean="0"/>
-              <a:t>17</a:t>
+              <a:t>/17</a:t>
             </a:r>
             <a:endParaRPr lang="en-US" sz="1600" dirty="0"/>
           </a:p>
@@ -12808,11 +12705,7 @@
             </a:fld>
             <a:r>
               <a:rPr lang="en-US" sz="1600" dirty="0" smtClean="0"/>
-              <a:t>/</a:t>
-            </a:r>
-            <a:r>
-              <a:rPr lang="en-US" sz="1600" dirty="0" smtClean="0"/>
-              <a:t>17</a:t>
+              <a:t>/17</a:t>
             </a:r>
             <a:endParaRPr lang="en-US" sz="1600" dirty="0"/>
           </a:p>
@@ -12909,11 +12802,7 @@
           <a:p>
             <a:r>
               <a:rPr lang="en-US" sz="2800" dirty="0" smtClean="0"/>
-              <a:t>Find causal </a:t>
-            </a:r>
-            <a:r>
-              <a:rPr lang="en-US" sz="2800" dirty="0" smtClean="0"/>
-              <a:t>SNPs via </a:t>
+              <a:t>Find causal SNPs via </a:t>
             </a:r>
             <a:r>
               <a:rPr lang="en-US" sz="2800" dirty="0" err="1" smtClean="0"/>
@@ -13229,11 +13118,7 @@
             </a:fld>
             <a:r>
               <a:rPr lang="en-US" sz="1600" dirty="0" smtClean="0"/>
-              <a:t>/</a:t>
-            </a:r>
-            <a:r>
-              <a:rPr lang="en-US" sz="1600" dirty="0" smtClean="0"/>
-              <a:t>17</a:t>
+              <a:t>/17</a:t>
             </a:r>
             <a:endParaRPr lang="en-US" sz="1600" dirty="0"/>
           </a:p>
@@ -13925,11 +13810,7 @@
             </a:fld>
             <a:r>
               <a:rPr lang="en-US" sz="1600" dirty="0" smtClean="0"/>
-              <a:t>/</a:t>
-            </a:r>
-            <a:r>
-              <a:rPr lang="en-US" sz="1600" dirty="0" smtClean="0"/>
-              <a:t>17</a:t>
+              <a:t>/17</a:t>
             </a:r>
             <a:endParaRPr lang="en-US" sz="1600" dirty="0"/>
           </a:p>
@@ -14217,21 +14098,8 @@
             <a:pPr lvl="1"/>
             <a:r>
               <a:rPr lang="en-US" dirty="0" smtClean="0"/>
-              <a:t>Simple to compute </a:t>
-            </a:r>
-            <a:r>
-              <a:rPr lang="en-US" dirty="0" smtClean="0"/>
-              <a:t>(least </a:t>
-            </a:r>
-            <a:r>
-              <a:rPr lang="en-US" dirty="0" smtClean="0"/>
-              <a:t>squares </a:t>
-            </a:r>
-            <a:r>
-              <a:rPr lang="en-US" dirty="0" smtClean="0"/>
-              <a:t>or likelihood ratio tests)</a:t>
-            </a:r>
-            <a:endParaRPr lang="en-US" dirty="0" smtClean="0"/>
+              <a:t>Simple to compute (least squares or likelihood ratio tests)</a:t>
+            </a:r>
           </a:p>
           <a:p>
             <a:pPr lvl="1"/>
@@ -14313,11 +14181,7 @@
             </a:fld>
             <a:r>
               <a:rPr lang="en-US" sz="1600" dirty="0" smtClean="0"/>
-              <a:t>/</a:t>
-            </a:r>
-            <a:r>
-              <a:rPr lang="en-US" sz="1600" dirty="0" smtClean="0"/>
-              <a:t>17</a:t>
+              <a:t>/17</a:t>
             </a:r>
             <a:endParaRPr lang="en-US" sz="1600" dirty="0"/>
           </a:p>
@@ -14634,23 +14498,7 @@
                   <a:srgbClr val="FF0000"/>
                 </a:solidFill>
               </a:rPr>
-              <a:t>Adjusting for confounder </a:t>
-            </a:r>
-            <a:r>
-              <a:rPr lang="en-US" b="1" smtClean="0">
-                <a:solidFill>
-                  <a:srgbClr val="FF0000"/>
-                </a:solidFill>
-              </a:rPr>
-              <a:t>x2 can </a:t>
-            </a:r>
-            <a:r>
-              <a:rPr lang="en-US" b="1" dirty="0" smtClean="0">
-                <a:solidFill>
-                  <a:srgbClr val="FF0000"/>
-                </a:solidFill>
-              </a:rPr>
-              <a:t>reverse significance</a:t>
+              <a:t>Adjusting for confounder x2 can reverse significance</a:t>
             </a:r>
             <a:endParaRPr lang="en-US" b="1" dirty="0">
               <a:solidFill>
@@ -14686,11 +14534,7 @@
             </a:fld>
             <a:r>
               <a:rPr lang="en-US" sz="1600" dirty="0" smtClean="0"/>
-              <a:t>/</a:t>
-            </a:r>
-            <a:r>
-              <a:rPr lang="en-US" sz="1600" dirty="0" smtClean="0"/>
-              <a:t>17</a:t>
+              <a:t>/17</a:t>
             </a:r>
             <a:endParaRPr lang="en-US" sz="1600" dirty="0"/>
           </a:p>

</xml_diff>